<commit_message>
upd: major revision PPTX
</commit_message>
<xml_diff>
--- a/Paper Reading/____Writing/Fig_An_instance_of_State_Transition.pptx
+++ b/Paper Reading/____Writing/Fig_An_instance_of_State_Transition.pptx
@@ -243,7 +243,7 @@
           <a:p>
             <a:fld id="{F9E1D621-6B0E-4025-9F27-5EA14815B164}" type="datetimeFigureOut">
               <a:rPr lang="zh-CN" altLang="en-US" smtClean="0"/>
-              <a:t>2025/5/14</a:t>
+              <a:t>2025/9/9</a:t>
             </a:fld>
             <a:endParaRPr lang="zh-CN" altLang="en-US"/>
           </a:p>
@@ -413,7 +413,7 @@
           <a:p>
             <a:fld id="{F9E1D621-6B0E-4025-9F27-5EA14815B164}" type="datetimeFigureOut">
               <a:rPr lang="zh-CN" altLang="en-US" smtClean="0"/>
-              <a:t>2025/5/14</a:t>
+              <a:t>2025/9/9</a:t>
             </a:fld>
             <a:endParaRPr lang="zh-CN" altLang="en-US"/>
           </a:p>
@@ -593,7 +593,7 @@
           <a:p>
             <a:fld id="{F9E1D621-6B0E-4025-9F27-5EA14815B164}" type="datetimeFigureOut">
               <a:rPr lang="zh-CN" altLang="en-US" smtClean="0"/>
-              <a:t>2025/5/14</a:t>
+              <a:t>2025/9/9</a:t>
             </a:fld>
             <a:endParaRPr lang="zh-CN" altLang="en-US"/>
           </a:p>
@@ -763,7 +763,7 @@
           <a:p>
             <a:fld id="{F9E1D621-6B0E-4025-9F27-5EA14815B164}" type="datetimeFigureOut">
               <a:rPr lang="zh-CN" altLang="en-US" smtClean="0"/>
-              <a:t>2025/5/14</a:t>
+              <a:t>2025/9/9</a:t>
             </a:fld>
             <a:endParaRPr lang="zh-CN" altLang="en-US"/>
           </a:p>
@@ -1009,7 +1009,7 @@
           <a:p>
             <a:fld id="{F9E1D621-6B0E-4025-9F27-5EA14815B164}" type="datetimeFigureOut">
               <a:rPr lang="zh-CN" altLang="en-US" smtClean="0"/>
-              <a:t>2025/5/14</a:t>
+              <a:t>2025/9/9</a:t>
             </a:fld>
             <a:endParaRPr lang="zh-CN" altLang="en-US"/>
           </a:p>
@@ -1241,7 +1241,7 @@
           <a:p>
             <a:fld id="{F9E1D621-6B0E-4025-9F27-5EA14815B164}" type="datetimeFigureOut">
               <a:rPr lang="zh-CN" altLang="en-US" smtClean="0"/>
-              <a:t>2025/5/14</a:t>
+              <a:t>2025/9/9</a:t>
             </a:fld>
             <a:endParaRPr lang="zh-CN" altLang="en-US"/>
           </a:p>
@@ -1608,7 +1608,7 @@
           <a:p>
             <a:fld id="{F9E1D621-6B0E-4025-9F27-5EA14815B164}" type="datetimeFigureOut">
               <a:rPr lang="zh-CN" altLang="en-US" smtClean="0"/>
-              <a:t>2025/5/14</a:t>
+              <a:t>2025/9/9</a:t>
             </a:fld>
             <a:endParaRPr lang="zh-CN" altLang="en-US"/>
           </a:p>
@@ -1726,7 +1726,7 @@
           <a:p>
             <a:fld id="{F9E1D621-6B0E-4025-9F27-5EA14815B164}" type="datetimeFigureOut">
               <a:rPr lang="zh-CN" altLang="en-US" smtClean="0"/>
-              <a:t>2025/5/14</a:t>
+              <a:t>2025/9/9</a:t>
             </a:fld>
             <a:endParaRPr lang="zh-CN" altLang="en-US"/>
           </a:p>
@@ -1821,7 +1821,7 @@
           <a:p>
             <a:fld id="{F9E1D621-6B0E-4025-9F27-5EA14815B164}" type="datetimeFigureOut">
               <a:rPr lang="zh-CN" altLang="en-US" smtClean="0"/>
-              <a:t>2025/5/14</a:t>
+              <a:t>2025/9/9</a:t>
             </a:fld>
             <a:endParaRPr lang="zh-CN" altLang="en-US"/>
           </a:p>
@@ -2098,7 +2098,7 @@
           <a:p>
             <a:fld id="{F9E1D621-6B0E-4025-9F27-5EA14815B164}" type="datetimeFigureOut">
               <a:rPr lang="zh-CN" altLang="en-US" smtClean="0"/>
-              <a:t>2025/5/14</a:t>
+              <a:t>2025/9/9</a:t>
             </a:fld>
             <a:endParaRPr lang="zh-CN" altLang="en-US"/>
           </a:p>
@@ -2355,7 +2355,7 @@
           <a:p>
             <a:fld id="{F9E1D621-6B0E-4025-9F27-5EA14815B164}" type="datetimeFigureOut">
               <a:rPr lang="zh-CN" altLang="en-US" smtClean="0"/>
-              <a:t>2025/5/14</a:t>
+              <a:t>2025/9/9</a:t>
             </a:fld>
             <a:endParaRPr lang="zh-CN" altLang="en-US"/>
           </a:p>
@@ -2568,7 +2568,7 @@
           <a:p>
             <a:fld id="{F9E1D621-6B0E-4025-9F27-5EA14815B164}" type="datetimeFigureOut">
               <a:rPr lang="zh-CN" altLang="en-US" smtClean="0"/>
-              <a:t>2025/5/14</a:t>
+              <a:t>2025/9/9</a:t>
             </a:fld>
             <a:endParaRPr lang="zh-CN" altLang="en-US"/>
           </a:p>
@@ -2989,8 +2989,8 @@
             </p:nvSpPr>
             <p:spPr>
               <a:xfrm>
-                <a:off x="106975" y="841567"/>
-                <a:ext cx="2989378" cy="341962"/>
+                <a:off x="106975" y="543117"/>
+                <a:ext cx="2989378" cy="360000"/>
               </a:xfrm>
               <a:prstGeom prst="roundRect">
                 <a:avLst/>
@@ -3055,7 +3055,7 @@
                   </m:oMath>
                 </a14:m>
                 <a:r>
-                  <a:rPr lang="en-US" altLang="zh-CN" dirty="0">
+                  <a:rPr lang="en-US" altLang="zh-CN" sz="1600" dirty="0">
                     <a:latin typeface="Consolas" panose="020B0609020204030204" pitchFamily="49" charset="0"/>
                     <a:cs typeface="Arial" panose="020B0604020202020204" pitchFamily="34" charset="0"/>
                   </a:rPr>
@@ -3086,8 +3086,8 @@
             </p:nvSpPr>
             <p:spPr>
               <a:xfrm>
-                <a:off x="106975" y="841567"/>
-                <a:ext cx="2989378" cy="341962"/>
+                <a:off x="106975" y="543117"/>
+                <a:ext cx="2989378" cy="360000"/>
               </a:xfrm>
               <a:prstGeom prst="roundRect">
                 <a:avLst/>
@@ -3095,7 +3095,7 @@
               <a:blipFill>
                 <a:blip r:embed="rId2"/>
                 <a:stretch>
-                  <a:fillRect t="-12281" b="-29825"/>
+                  <a:fillRect b="-18333"/>
                 </a:stretch>
               </a:blipFill>
             </p:spPr>
@@ -3104,7 +3104,7 @@
               <a:lstStyle/>
               <a:p>
                 <a:r>
-                  <a:rPr lang="zh-CN" altLang="en-US">
+                  <a:rPr lang="en-HK">
                     <a:noFill/>
                   </a:rPr>
                   <a:t> </a:t>
@@ -3130,8 +3130,8 @@
             </p:nvSpPr>
             <p:spPr>
               <a:xfrm>
-                <a:off x="4466519" y="712747"/>
-                <a:ext cx="2216257" cy="567086"/>
+                <a:off x="4466519" y="414297"/>
+                <a:ext cx="2216257" cy="576000"/>
               </a:xfrm>
               <a:prstGeom prst="roundRect">
                 <a:avLst/>
@@ -3196,7 +3196,7 @@
                   </m:oMath>
                 </a14:m>
                 <a:r>
-                  <a:rPr lang="en-US" altLang="zh-CN" sz="1700" dirty="0">
+                  <a:rPr lang="en-US" altLang="zh-CN" sz="1600" dirty="0">
                     <a:latin typeface="Consolas" panose="020B0609020204030204" pitchFamily="49" charset="0"/>
                     <a:cs typeface="Arial" panose="020B0604020202020204" pitchFamily="34" charset="0"/>
                   </a:rPr>
@@ -3206,13 +3206,13 @@
               <a:p>
                 <a:pPr algn="ctr"/>
                 <a:r>
-                  <a:rPr lang="en-US" altLang="zh-CN" sz="1700" dirty="0">
+                  <a:rPr lang="en-US" altLang="zh-CN" sz="1600" dirty="0">
                     <a:latin typeface="Consolas" panose="020B0609020204030204" pitchFamily="49" charset="0"/>
                     <a:cs typeface="Arial" panose="020B0604020202020204" pitchFamily="34" charset="0"/>
                   </a:rPr>
                   <a:t>Speed-Up Skills</a:t>
                 </a:r>
-                <a:endParaRPr lang="zh-CN" altLang="en-US" sz="1700" dirty="0">
+                <a:endParaRPr lang="zh-CN" altLang="en-US" sz="1600" dirty="0">
                   <a:latin typeface="Consolas" panose="020B0609020204030204" pitchFamily="49" charset="0"/>
                   <a:cs typeface="Arial" panose="020B0604020202020204" pitchFamily="34" charset="0"/>
                 </a:endParaRPr>
@@ -3237,8 +3237,8 @@
             </p:nvSpPr>
             <p:spPr>
               <a:xfrm>
-                <a:off x="4466519" y="712747"/>
-                <a:ext cx="2216257" cy="567086"/>
+                <a:off x="4466519" y="414297"/>
+                <a:ext cx="2216257" cy="576000"/>
               </a:xfrm>
               <a:prstGeom prst="roundRect">
                 <a:avLst/>
@@ -3246,7 +3246,7 @@
               <a:blipFill>
                 <a:blip r:embed="rId3"/>
                 <a:stretch>
-                  <a:fillRect t="-8511" b="-19149"/>
+                  <a:fillRect t="-4211" b="-15789"/>
                 </a:stretch>
               </a:blipFill>
             </p:spPr>
@@ -3255,7 +3255,7 @@
               <a:lstStyle/>
               <a:p>
                 <a:r>
-                  <a:rPr lang="zh-CN" altLang="en-US">
+                  <a:rPr lang="en-HK">
                     <a:noFill/>
                   </a:rPr>
                   <a:t> </a:t>
@@ -3265,8 +3265,8 @@
           </p:sp>
         </mc:Fallback>
       </mc:AlternateContent>
-      <mc:AlternateContent xmlns:mc="http://schemas.openxmlformats.org/markup-compatibility/2006" xmlns:a14="http://schemas.microsoft.com/office/drawing/2010/main">
-        <mc:Choice Requires="a14">
+      <mc:AlternateContent xmlns:mc="http://schemas.openxmlformats.org/markup-compatibility/2006">
+        <mc:Choice xmlns:a14="http://schemas.microsoft.com/office/drawing/2010/main" Requires="a14">
           <p:sp>
             <p:nvSpPr>
               <p:cNvPr id="11" name="矩形: 圆角 10">
@@ -3281,8 +3281,8 @@
             </p:nvSpPr>
             <p:spPr>
               <a:xfrm>
-                <a:off x="118401" y="2155056"/>
-                <a:ext cx="2966527" cy="341962"/>
+                <a:off x="118401" y="1559282"/>
+                <a:ext cx="2966527" cy="360000"/>
               </a:xfrm>
               <a:prstGeom prst="roundRect">
                 <a:avLst/>
@@ -3354,7 +3354,7 @@
                   </m:oMath>
                 </a14:m>
                 <a:r>
-                  <a:rPr lang="en-US" altLang="zh-CN" dirty="0">
+                  <a:rPr lang="en-US" altLang="zh-CN" sz="1600" dirty="0">
                     <a:latin typeface="Consolas" panose="020B0609020204030204" pitchFamily="49" charset="0"/>
                     <a:cs typeface="Arial" panose="020B0604020202020204" pitchFamily="34" charset="0"/>
                   </a:rPr>
@@ -3368,7 +3368,7 @@
             </p:txBody>
           </p:sp>
         </mc:Choice>
-        <mc:Fallback xmlns="">
+        <mc:Fallback>
           <p:sp>
             <p:nvSpPr>
               <p:cNvPr id="11" name="矩形: 圆角 10">
@@ -3385,8 +3385,8 @@
             </p:nvSpPr>
             <p:spPr>
               <a:xfrm>
-                <a:off x="118401" y="2155056"/>
-                <a:ext cx="2966527" cy="341962"/>
+                <a:off x="118401" y="1559282"/>
+                <a:ext cx="2966527" cy="360000"/>
               </a:xfrm>
               <a:prstGeom prst="roundRect">
                 <a:avLst/>
@@ -3394,7 +3394,7 @@
               <a:blipFill>
                 <a:blip r:embed="rId4"/>
                 <a:stretch>
-                  <a:fillRect t="-14035" b="-29825"/>
+                  <a:fillRect b="-18333"/>
                 </a:stretch>
               </a:blipFill>
             </p:spPr>
@@ -3403,7 +3403,7 @@
               <a:lstStyle/>
               <a:p>
                 <a:r>
-                  <a:rPr lang="zh-CN" altLang="en-US">
+                  <a:rPr lang="en-HK">
                     <a:noFill/>
                   </a:rPr>
                   <a:t> </a:t>
@@ -3413,8 +3413,8 @@
           </p:sp>
         </mc:Fallback>
       </mc:AlternateContent>
-      <mc:AlternateContent xmlns:mc="http://schemas.openxmlformats.org/markup-compatibility/2006" xmlns:a14="http://schemas.microsoft.com/office/drawing/2010/main">
-        <mc:Choice Requires="a14">
+      <mc:AlternateContent xmlns:mc="http://schemas.openxmlformats.org/markup-compatibility/2006">
+        <mc:Choice xmlns:a14="http://schemas.microsoft.com/office/drawing/2010/main" Requires="a14">
           <p:sp>
             <p:nvSpPr>
               <p:cNvPr id="12" name="矩形: 圆角 11">
@@ -3429,8 +3429,8 @@
             </p:nvSpPr>
             <p:spPr>
               <a:xfrm>
-                <a:off x="4430960" y="1959263"/>
-                <a:ext cx="2287377" cy="701039"/>
+                <a:off x="4430960" y="1425829"/>
+                <a:ext cx="2287377" cy="576000"/>
               </a:xfrm>
               <a:prstGeom prst="roundRect">
                 <a:avLst/>
@@ -3502,7 +3502,7 @@
                   </m:oMath>
                 </a14:m>
                 <a:r>
-                  <a:rPr lang="en-US" altLang="zh-CN" dirty="0">
+                  <a:rPr lang="en-US" altLang="zh-CN" sz="1600" dirty="0">
                     <a:latin typeface="Consolas" panose="020B0609020204030204" pitchFamily="49" charset="0"/>
                     <a:cs typeface="Arial" panose="020B0604020202020204" pitchFamily="34" charset="0"/>
                   </a:rPr>
@@ -3516,7 +3516,7 @@
             </p:txBody>
           </p:sp>
         </mc:Choice>
-        <mc:Fallback xmlns="">
+        <mc:Fallback>
           <p:sp>
             <p:nvSpPr>
               <p:cNvPr id="12" name="矩形: 圆角 11">
@@ -3533,8 +3533,8 @@
             </p:nvSpPr>
             <p:spPr>
               <a:xfrm>
-                <a:off x="4430960" y="1959263"/>
-                <a:ext cx="2287377" cy="701039"/>
+                <a:off x="4430960" y="1425829"/>
+                <a:ext cx="2287377" cy="576000"/>
               </a:xfrm>
               <a:prstGeom prst="roundRect">
                 <a:avLst/>
@@ -3542,7 +3542,7 @@
               <a:blipFill>
                 <a:blip r:embed="rId5"/>
                 <a:stretch>
-                  <a:fillRect l="-266" t="-862" b="-11207"/>
+                  <a:fillRect t="-4211" b="-16842"/>
                 </a:stretch>
               </a:blipFill>
             </p:spPr>
@@ -3551,7 +3551,7 @@
               <a:lstStyle/>
               <a:p>
                 <a:r>
-                  <a:rPr lang="zh-CN" altLang="en-US">
+                  <a:rPr lang="en-HK">
                     <a:noFill/>
                   </a:rPr>
                   <a:t> </a:t>
@@ -3579,8 +3579,8 @@
         </p:nvCxnSpPr>
         <p:spPr>
           <a:xfrm>
-            <a:off x="1601664" y="1183531"/>
-            <a:ext cx="0" cy="971527"/>
+            <a:off x="1601664" y="903117"/>
+            <a:ext cx="1" cy="656165"/>
           </a:xfrm>
           <a:prstGeom prst="straightConnector1">
             <a:avLst/>
@@ -3622,15 +3622,13 @@
           </p:cNvPr>
           <p:cNvCxnSpPr>
             <a:cxnSpLocks/>
-            <a:stCxn id="4" idx="3"/>
-            <a:endCxn id="5" idx="1"/>
           </p:cNvCxnSpPr>
           <p:nvPr/>
         </p:nvCxnSpPr>
         <p:spPr>
-          <a:xfrm flipV="1">
-            <a:off x="3096353" y="996290"/>
-            <a:ext cx="1370162" cy="16258"/>
+          <a:xfrm>
+            <a:off x="3096353" y="714098"/>
+            <a:ext cx="1368000" cy="0"/>
           </a:xfrm>
           <a:prstGeom prst="straightConnector1">
             <a:avLst/>
@@ -3655,8 +3653,8 @@
           </a:fontRef>
         </p:style>
       </p:cxnSp>
-      <mc:AlternateContent xmlns:mc="http://schemas.openxmlformats.org/markup-compatibility/2006">
-        <mc:Choice xmlns:a14="http://schemas.microsoft.com/office/drawing/2010/main" Requires="a14">
+      <mc:AlternateContent xmlns:mc="http://schemas.openxmlformats.org/markup-compatibility/2006" xmlns:a14="http://schemas.microsoft.com/office/drawing/2010/main">
+        <mc:Choice Requires="a14">
           <p:sp>
             <p:nvSpPr>
               <p:cNvPr id="70" name="文本框 69">
@@ -3671,7 +3669,7 @@
             </p:nvSpPr>
             <p:spPr>
               <a:xfrm>
-                <a:off x="3698323" y="616950"/>
+                <a:off x="3730073" y="318500"/>
                 <a:ext cx="261880" cy="369332"/>
               </a:xfrm>
               <a:prstGeom prst="rect">
@@ -3693,16 +3691,16 @@
                     </m:oMathParaPr>
                     <m:oMath xmlns:m="http://schemas.openxmlformats.org/officeDocument/2006/math">
                       <m:r>
-                        <a:rPr lang="en-US" altLang="zh-CN" b="0" i="1">
+                        <a:rPr lang="en-US" altLang="zh-CN" b="1" i="1">
                           <a:latin typeface="Cambria Math" panose="02040503050406030204" pitchFamily="18" charset="0"/>
                           <a:cs typeface="Times New Roman" panose="02020603050405020304" pitchFamily="18" charset="0"/>
                         </a:rPr>
-                        <m:t>𝑝</m:t>
+                        <m:t>𝒑</m:t>
                       </m:r>
                     </m:oMath>
                   </m:oMathPara>
                 </a14:m>
-                <a:endParaRPr lang="zh-CN" altLang="en-US" i="1" dirty="0">
+                <a:endParaRPr lang="zh-CN" altLang="en-US" b="1" i="1" dirty="0">
                   <a:latin typeface="Times New Roman" panose="02020603050405020304" pitchFamily="18" charset="0"/>
                   <a:cs typeface="Times New Roman" panose="02020603050405020304" pitchFamily="18" charset="0"/>
                 </a:endParaRPr>
@@ -3710,7 +3708,7 @@
             </p:txBody>
           </p:sp>
         </mc:Choice>
-        <mc:Fallback>
+        <mc:Fallback xmlns="">
           <p:sp>
             <p:nvSpPr>
               <p:cNvPr id="70" name="文本框 69">
@@ -3727,7 +3725,7 @@
             </p:nvSpPr>
             <p:spPr>
               <a:xfrm>
-                <a:off x="3698323" y="616950"/>
+                <a:off x="3730073" y="318500"/>
                 <a:ext cx="261880" cy="369332"/>
               </a:xfrm>
               <a:prstGeom prst="rect">
@@ -3736,7 +3734,7 @@
               <a:blipFill>
                 <a:blip r:embed="rId6"/>
                 <a:stretch>
-                  <a:fillRect r="-16279" b="-8197"/>
+                  <a:fillRect r="-23256" b="-8197"/>
                 </a:stretch>
               </a:blipFill>
             </p:spPr>
@@ -3745,7 +3743,7 @@
               <a:lstStyle/>
               <a:p>
                 <a:r>
-                  <a:rPr lang="zh-CN" altLang="en-US">
+                  <a:rPr lang="en-HK">
                     <a:noFill/>
                   </a:rPr>
                   <a:t> </a:t>
@@ -3770,8 +3768,8 @@
               <p:nvPr/>
             </p:nvSpPr>
             <p:spPr>
-              <a:xfrm>
-                <a:off x="3053163" y="1356065"/>
+              <a:xfrm rot="-660000">
+                <a:off x="3018520" y="937509"/>
                 <a:ext cx="886905" cy="369332"/>
               </a:xfrm>
               <a:prstGeom prst="rect">
@@ -3793,7 +3791,7 @@
                     </m:oMathParaPr>
                     <m:oMath xmlns:m="http://schemas.openxmlformats.org/officeDocument/2006/math">
                       <m:r>
-                        <a:rPr lang="en-US" altLang="zh-CN" b="0" i="1" dirty="0">
+                        <a:rPr lang="en-US" altLang="zh-CN" b="1" i="1" dirty="0">
                           <a:solidFill>
                             <a:schemeClr val="tx1">
                               <a:alpha val="50000"/>
@@ -3802,10 +3800,10 @@
                           <a:latin typeface="Cambria Math" panose="02040503050406030204" pitchFamily="18" charset="0"/>
                           <a:cs typeface="Times New Roman" panose="02020603050405020304" pitchFamily="18" charset="0"/>
                         </a:rPr>
-                        <m:t>1−</m:t>
+                        <m:t>𝟏</m:t>
                       </m:r>
                       <m:r>
-                        <a:rPr lang="en-US" altLang="zh-CN" b="0" i="1" dirty="0">
+                        <a:rPr lang="en-US" altLang="zh-CN" b="1" i="1" dirty="0">
                           <a:solidFill>
                             <a:schemeClr val="tx1">
                               <a:alpha val="50000"/>
@@ -3814,12 +3812,24 @@
                           <a:latin typeface="Cambria Math" panose="02040503050406030204" pitchFamily="18" charset="0"/>
                           <a:cs typeface="Times New Roman" panose="02020603050405020304" pitchFamily="18" charset="0"/>
                         </a:rPr>
-                        <m:t>𝑝</m:t>
+                        <m:t>−</m:t>
+                      </m:r>
+                      <m:r>
+                        <a:rPr lang="en-US" altLang="zh-CN" b="1" i="1" dirty="0">
+                          <a:solidFill>
+                            <a:schemeClr val="tx1">
+                              <a:alpha val="50000"/>
+                            </a:schemeClr>
+                          </a:solidFill>
+                          <a:latin typeface="Cambria Math" panose="02040503050406030204" pitchFamily="18" charset="0"/>
+                          <a:cs typeface="Times New Roman" panose="02020603050405020304" pitchFamily="18" charset="0"/>
+                        </a:rPr>
+                        <m:t>𝒑</m:t>
                       </m:r>
                     </m:oMath>
                   </m:oMathPara>
                 </a14:m>
-                <a:endParaRPr lang="zh-CN" altLang="en-US" i="1" dirty="0">
+                <a:endParaRPr lang="zh-CN" altLang="en-US" b="1" i="1" dirty="0">
                   <a:solidFill>
                     <a:schemeClr val="tx1">
                       <a:alpha val="50000"/>
@@ -3848,8 +3858,8 @@
               <p:nvPr/>
             </p:nvSpPr>
             <p:spPr>
-              <a:xfrm>
-                <a:off x="3053163" y="1356065"/>
+              <a:xfrm rot="-660000">
+                <a:off x="3018520" y="937509"/>
                 <a:ext cx="886905" cy="369332"/>
               </a:xfrm>
               <a:prstGeom prst="rect">
@@ -3858,7 +3868,7 @@
               <a:blipFill>
                 <a:blip r:embed="rId7"/>
                 <a:stretch>
-                  <a:fillRect b="-8197"/>
+                  <a:fillRect/>
                 </a:stretch>
               </a:blipFill>
             </p:spPr>
@@ -3867,7 +3877,7 @@
               <a:lstStyle/>
               <a:p>
                 <a:r>
-                  <a:rPr lang="zh-CN" altLang="en-US">
+                  <a:rPr lang="en-HK">
                     <a:noFill/>
                   </a:rPr>
                   <a:t> </a:t>
@@ -3888,15 +3898,13 @@
           </p:cNvPr>
           <p:cNvCxnSpPr>
             <a:cxnSpLocks/>
-            <a:stCxn id="5" idx="2"/>
-            <a:endCxn id="12" idx="0"/>
           </p:cNvCxnSpPr>
           <p:nvPr/>
         </p:nvCxnSpPr>
         <p:spPr>
           <a:xfrm>
-            <a:off x="5574648" y="1279833"/>
-            <a:ext cx="1" cy="679426"/>
+            <a:off x="5574648" y="990297"/>
+            <a:ext cx="1" cy="435532"/>
           </a:xfrm>
           <a:prstGeom prst="straightConnector1">
             <a:avLst/>
@@ -3937,7 +3945,7 @@
             </p:nvSpPr>
             <p:spPr>
               <a:xfrm>
-                <a:off x="5530932" y="1387493"/>
+                <a:off x="5582882" y="1000145"/>
                 <a:ext cx="886905" cy="369332"/>
               </a:xfrm>
               <a:prstGeom prst="rect">
@@ -3959,16 +3967,16 @@
                     </m:oMathParaPr>
                     <m:oMath xmlns:m="http://schemas.openxmlformats.org/officeDocument/2006/math">
                       <m:r>
-                        <a:rPr lang="en-US" altLang="zh-CN" b="0" i="1" dirty="0">
+                        <a:rPr lang="en-US" altLang="zh-CN" b="1" i="1" dirty="0">
                           <a:latin typeface="Cambria Math" panose="02040503050406030204" pitchFamily="18" charset="0"/>
                           <a:cs typeface="Times New Roman" panose="02020603050405020304" pitchFamily="18" charset="0"/>
                         </a:rPr>
-                        <m:t>𝑝</m:t>
+                        <m:t>𝒑</m:t>
                       </m:r>
                     </m:oMath>
                   </m:oMathPara>
                 </a14:m>
-                <a:endParaRPr lang="zh-CN" altLang="en-US" i="1" dirty="0">
+                <a:endParaRPr lang="zh-CN" altLang="en-US" b="1" i="1" dirty="0">
                   <a:latin typeface="Times New Roman" panose="02020603050405020304" pitchFamily="18" charset="0"/>
                   <a:cs typeface="Times New Roman" panose="02020603050405020304" pitchFamily="18" charset="0"/>
                 </a:endParaRPr>
@@ -3993,7 +4001,7 @@
             </p:nvSpPr>
             <p:spPr>
               <a:xfrm>
-                <a:off x="5530932" y="1387493"/>
+                <a:off x="5582882" y="1000145"/>
                 <a:ext cx="886905" cy="369332"/>
               </a:xfrm>
               <a:prstGeom prst="rect">
@@ -4002,7 +4010,7 @@
               <a:blipFill>
                 <a:blip r:embed="rId8"/>
                 <a:stretch>
-                  <a:fillRect b="-8333"/>
+                  <a:fillRect b="-8197"/>
                 </a:stretch>
               </a:blipFill>
             </p:spPr>
@@ -4011,7 +4019,7 @@
               <a:lstStyle/>
               <a:p>
                 <a:r>
-                  <a:rPr lang="zh-CN" altLang="en-US">
+                  <a:rPr lang="en-HK">
                     <a:noFill/>
                   </a:rPr>
                   <a:t> </a:t>
@@ -4035,10 +4043,10 @@
         </p:nvGrpSpPr>
         <p:grpSpPr>
           <a:xfrm>
-            <a:off x="3572670" y="723846"/>
-            <a:ext cx="183799" cy="192218"/>
-            <a:chOff x="3674785" y="510011"/>
-            <a:chExt cx="183799" cy="192218"/>
+            <a:off x="3572670" y="415006"/>
+            <a:ext cx="188994" cy="202608"/>
+            <a:chOff x="3674785" y="499621"/>
+            <a:chExt cx="188994" cy="202608"/>
           </a:xfrm>
         </p:grpSpPr>
         <p:sp>
@@ -4062,9 +4070,7 @@
               <a:avLst/>
             </a:prstGeom>
             <a:solidFill>
-              <a:srgbClr val="000000">
-                <a:alpha val="100000"/>
-              </a:srgbClr>
+              <a:schemeClr val="accent1"/>
             </a:solidFill>
             <a:ln w="25400">
               <a:noFill/>
@@ -4098,7 +4104,7 @@
           </p:nvSpPr>
           <p:spPr>
             <a:xfrm>
-              <a:off x="3731584" y="510011"/>
+              <a:off x="3736779" y="499621"/>
               <a:ext cx="127000" cy="190500"/>
             </a:xfrm>
             <a:prstGeom prst="rect">
@@ -4153,10 +4159,10 @@
         </p:nvGrpSpPr>
         <p:grpSpPr>
           <a:xfrm>
-            <a:off x="5703038" y="1503713"/>
-            <a:ext cx="183799" cy="192218"/>
-            <a:chOff x="3674785" y="510011"/>
-            <a:chExt cx="183799" cy="192218"/>
+            <a:off x="5703038" y="1111170"/>
+            <a:ext cx="188994" cy="197413"/>
+            <a:chOff x="3674785" y="504816"/>
+            <a:chExt cx="188994" cy="197413"/>
           </a:xfrm>
         </p:grpSpPr>
         <p:sp>
@@ -4180,9 +4186,7 @@
               <a:avLst/>
             </a:prstGeom>
             <a:solidFill>
-              <a:srgbClr val="000000">
-                <a:alpha val="100000"/>
-              </a:srgbClr>
+              <a:schemeClr val="accent1"/>
             </a:solidFill>
             <a:ln w="25400">
               <a:noFill/>
@@ -4216,7 +4220,7 @@
           </p:nvSpPr>
           <p:spPr>
             <a:xfrm>
-              <a:off x="3731584" y="510011"/>
+              <a:off x="3736779" y="504816"/>
               <a:ext cx="127000" cy="190500"/>
             </a:xfrm>
             <a:prstGeom prst="rect">
@@ -4275,8 +4279,8 @@
         </p:nvCxnSpPr>
         <p:spPr>
           <a:xfrm flipH="1">
-            <a:off x="1601664" y="1279835"/>
-            <a:ext cx="3972980" cy="875223"/>
+            <a:off x="1601665" y="990297"/>
+            <a:ext cx="3972983" cy="568985"/>
           </a:xfrm>
           <a:prstGeom prst="straightConnector1">
             <a:avLst/>
@@ -4307,8 +4311,8 @@
           </a:fontRef>
         </p:style>
       </p:cxnSp>
-      <mc:AlternateContent xmlns:mc="http://schemas.openxmlformats.org/markup-compatibility/2006">
-        <mc:Choice xmlns:a14="http://schemas.microsoft.com/office/drawing/2010/main" Requires="a14">
+      <mc:AlternateContent xmlns:mc="http://schemas.openxmlformats.org/markup-compatibility/2006" xmlns:a14="http://schemas.microsoft.com/office/drawing/2010/main">
+        <mc:Choice Requires="a14">
           <p:sp>
             <p:nvSpPr>
               <p:cNvPr id="89" name="文本框 88">
@@ -4323,7 +4327,7 @@
             </p:nvSpPr>
             <p:spPr>
               <a:xfrm>
-                <a:off x="822436" y="1386229"/>
+                <a:off x="822436" y="1087779"/>
                 <a:ext cx="886905" cy="369332"/>
               </a:xfrm>
               <a:prstGeom prst="rect">
@@ -4345,7 +4349,7 @@
                     </m:oMathParaPr>
                     <m:oMath xmlns:m="http://schemas.openxmlformats.org/officeDocument/2006/math">
                       <m:r>
-                        <a:rPr lang="en-US" altLang="zh-CN" b="0" i="1" dirty="0">
+                        <a:rPr lang="en-US" altLang="zh-CN" b="1" i="1" dirty="0">
                           <a:solidFill>
                             <a:schemeClr val="tx1">
                               <a:alpha val="50000"/>
@@ -4354,10 +4358,10 @@
                           <a:latin typeface="Cambria Math" panose="02040503050406030204" pitchFamily="18" charset="0"/>
                           <a:cs typeface="Times New Roman" panose="02020603050405020304" pitchFamily="18" charset="0"/>
                         </a:rPr>
-                        <m:t>1−</m:t>
+                        <m:t>𝟏</m:t>
                       </m:r>
                       <m:r>
-                        <a:rPr lang="en-US" altLang="zh-CN" b="0" i="1" dirty="0">
+                        <a:rPr lang="en-US" altLang="zh-CN" b="1" i="1" dirty="0">
                           <a:solidFill>
                             <a:schemeClr val="tx1">
                               <a:alpha val="50000"/>
@@ -4366,12 +4370,24 @@
                           <a:latin typeface="Cambria Math" panose="02040503050406030204" pitchFamily="18" charset="0"/>
                           <a:cs typeface="Times New Roman" panose="02020603050405020304" pitchFamily="18" charset="0"/>
                         </a:rPr>
-                        <m:t>𝑝</m:t>
+                        <m:t>−</m:t>
+                      </m:r>
+                      <m:r>
+                        <a:rPr lang="en-US" altLang="zh-CN" b="1" i="1" dirty="0">
+                          <a:solidFill>
+                            <a:schemeClr val="tx1">
+                              <a:alpha val="50000"/>
+                            </a:schemeClr>
+                          </a:solidFill>
+                          <a:latin typeface="Cambria Math" panose="02040503050406030204" pitchFamily="18" charset="0"/>
+                          <a:cs typeface="Times New Roman" panose="02020603050405020304" pitchFamily="18" charset="0"/>
+                        </a:rPr>
+                        <m:t>𝒑</m:t>
                       </m:r>
                     </m:oMath>
                   </m:oMathPara>
                 </a14:m>
-                <a:endParaRPr lang="zh-CN" altLang="en-US" i="1" dirty="0">
+                <a:endParaRPr lang="zh-CN" altLang="en-US" b="1" i="1" dirty="0">
                   <a:solidFill>
                     <a:schemeClr val="tx1">
                       <a:alpha val="50000"/>
@@ -4384,7 +4400,7 @@
             </p:txBody>
           </p:sp>
         </mc:Choice>
-        <mc:Fallback>
+        <mc:Fallback xmlns="">
           <p:sp>
             <p:nvSpPr>
               <p:cNvPr id="89" name="文本框 88">
@@ -4401,7 +4417,7 @@
             </p:nvSpPr>
             <p:spPr>
               <a:xfrm>
-                <a:off x="822436" y="1386229"/>
+                <a:off x="822436" y="1087779"/>
                 <a:ext cx="886905" cy="369332"/>
               </a:xfrm>
               <a:prstGeom prst="rect">
@@ -4419,7 +4435,7 @@
               <a:lstStyle/>
               <a:p>
                 <a:r>
-                  <a:rPr lang="zh-CN" altLang="en-US">
+                  <a:rPr lang="en-HK">
                     <a:noFill/>
                   </a:rPr>
                   <a:t> </a:t>
@@ -4440,15 +4456,13 @@
           </p:cNvPr>
           <p:cNvCxnSpPr>
             <a:cxnSpLocks/>
-            <a:stCxn id="12" idx="1"/>
-            <a:endCxn id="11" idx="3"/>
           </p:cNvCxnSpPr>
           <p:nvPr/>
         </p:nvCxnSpPr>
         <p:spPr>
           <a:xfrm flipH="1">
-            <a:off x="3084931" y="2309779"/>
-            <a:ext cx="1346029" cy="16258"/>
+            <a:off x="3078750" y="1730264"/>
+            <a:ext cx="1353694" cy="0"/>
           </a:xfrm>
           <a:prstGeom prst="straightConnector1">
             <a:avLst/>
@@ -4489,7 +4503,7 @@
             </p:nvSpPr>
             <p:spPr>
               <a:xfrm>
-                <a:off x="3387918" y="2290967"/>
+                <a:off x="3387918" y="1688345"/>
                 <a:ext cx="967021" cy="369332"/>
               </a:xfrm>
               <a:prstGeom prst="rect">
@@ -4511,23 +4525,30 @@
                     </m:oMathParaPr>
                     <m:oMath xmlns:m="http://schemas.openxmlformats.org/officeDocument/2006/math">
                       <m:r>
-                        <a:rPr lang="en-US" altLang="zh-CN" b="0" i="1">
+                        <a:rPr lang="en-US" altLang="zh-CN" b="1" i="1">
                           <a:latin typeface="Cambria Math" panose="02040503050406030204" pitchFamily="18" charset="0"/>
                           <a:cs typeface="Times New Roman" panose="02020603050405020304" pitchFamily="18" charset="0"/>
                         </a:rPr>
-                        <m:t>1−</m:t>
+                        <m:t>𝟏</m:t>
                       </m:r>
                       <m:r>
-                        <a:rPr lang="en-US" altLang="zh-CN" b="0" i="1">
+                        <a:rPr lang="en-US" altLang="zh-CN" b="1" i="1">
                           <a:latin typeface="Cambria Math" panose="02040503050406030204" pitchFamily="18" charset="0"/>
                           <a:cs typeface="Times New Roman" panose="02020603050405020304" pitchFamily="18" charset="0"/>
                         </a:rPr>
-                        <m:t>𝑝</m:t>
+                        <m:t>−</m:t>
+                      </m:r>
+                      <m:r>
+                        <a:rPr lang="en-US" altLang="zh-CN" b="1" i="1">
+                          <a:latin typeface="Cambria Math" panose="02040503050406030204" pitchFamily="18" charset="0"/>
+                          <a:cs typeface="Times New Roman" panose="02020603050405020304" pitchFamily="18" charset="0"/>
+                        </a:rPr>
+                        <m:t>𝒑</m:t>
                       </m:r>
                     </m:oMath>
                   </m:oMathPara>
                 </a14:m>
-                <a:endParaRPr lang="zh-CN" altLang="en-US" i="1" dirty="0">
+                <a:endParaRPr lang="zh-CN" altLang="en-US" b="1" i="1" dirty="0">
                   <a:latin typeface="Times New Roman" panose="02020603050405020304" pitchFamily="18" charset="0"/>
                   <a:cs typeface="Times New Roman" panose="02020603050405020304" pitchFamily="18" charset="0"/>
                 </a:endParaRPr>
@@ -4552,7 +4573,7 @@
             </p:nvSpPr>
             <p:spPr>
               <a:xfrm>
-                <a:off x="3387918" y="2290967"/>
+                <a:off x="3387918" y="1688345"/>
                 <a:ext cx="967021" cy="369332"/>
               </a:xfrm>
               <a:prstGeom prst="rect">
@@ -4561,7 +4582,7 @@
               <a:blipFill>
                 <a:blip r:embed="rId10"/>
                 <a:stretch>
-                  <a:fillRect b="-8333"/>
+                  <a:fillRect b="-6557"/>
                 </a:stretch>
               </a:blipFill>
             </p:spPr>
@@ -4570,7 +4591,7 @@
               <a:lstStyle/>
               <a:p>
                 <a:r>
-                  <a:rPr lang="zh-CN" altLang="en-US">
+                  <a:rPr lang="en-HK">
                     <a:noFill/>
                   </a:rPr>
                   <a:t> </a:t>
@@ -4594,7 +4615,7 @@
         </p:nvGrpSpPr>
         <p:grpSpPr>
           <a:xfrm>
-            <a:off x="3376317" y="2365838"/>
+            <a:off x="3335960" y="1787896"/>
             <a:ext cx="183799" cy="192218"/>
             <a:chOff x="3674785" y="510011"/>
             <a:chExt cx="183799" cy="192218"/>
@@ -4621,9 +4642,7 @@
               <a:avLst/>
             </a:prstGeom>
             <a:solidFill>
-              <a:srgbClr val="000000">
-                <a:alpha val="100000"/>
-              </a:srgbClr>
+              <a:schemeClr val="accent1"/>
             </a:solidFill>
             <a:ln w="25400">
               <a:noFill/>
@@ -4639,7 +4658,7 @@
               <a:pPr algn="ctr">
                 <a:defRPr/>
               </a:pPr>
-              <a:endParaRPr sz="2628"/>
+              <a:endParaRPr sz="2628" dirty="0"/>
             </a:p>
           </p:txBody>
         </p:sp>
@@ -4715,8 +4734,8 @@
         </p:nvCxnSpPr>
         <p:spPr>
           <a:xfrm flipH="1">
-            <a:off x="5574644" y="2660302"/>
-            <a:ext cx="4" cy="446303"/>
+            <a:off x="5574645" y="2001829"/>
+            <a:ext cx="4" cy="360000"/>
           </a:xfrm>
           <a:prstGeom prst="straightConnector1">
             <a:avLst/>
@@ -4761,7 +4780,7 @@
         </p:nvSpPr>
         <p:spPr>
           <a:xfrm>
-            <a:off x="5320407" y="2911396"/>
+            <a:off x="5326471" y="2155990"/>
             <a:ext cx="502061" cy="369332"/>
           </a:xfrm>
           <a:prstGeom prst="rect">
@@ -4795,14 +4814,13 @@
           </p:cNvPr>
           <p:cNvCxnSpPr>
             <a:cxnSpLocks/>
-            <a:endCxn id="4" idx="0"/>
           </p:cNvCxnSpPr>
           <p:nvPr/>
         </p:nvCxnSpPr>
         <p:spPr>
           <a:xfrm>
-            <a:off x="1601664" y="429147"/>
-            <a:ext cx="1" cy="412420"/>
+            <a:off x="1601664" y="190289"/>
+            <a:ext cx="0" cy="360000"/>
           </a:xfrm>
           <a:prstGeom prst="straightConnector1">
             <a:avLst/>
@@ -4841,7 +4859,7 @@
         </p:nvSpPr>
         <p:spPr>
           <a:xfrm>
-            <a:off x="1347427" y="115033"/>
+            <a:off x="1353778" y="-113067"/>
             <a:ext cx="502061" cy="369332"/>
           </a:xfrm>
           <a:prstGeom prst="rect">
@@ -4874,14 +4892,13 @@
           </p:cNvPr>
           <p:cNvCxnSpPr>
             <a:cxnSpLocks/>
-            <a:stCxn id="11" idx="2"/>
           </p:cNvCxnSpPr>
           <p:nvPr/>
         </p:nvCxnSpPr>
         <p:spPr>
-          <a:xfrm>
-            <a:off x="1601664" y="2497019"/>
-            <a:ext cx="0" cy="539027"/>
+          <a:xfrm flipH="1">
+            <a:off x="1601664" y="1921059"/>
+            <a:ext cx="1" cy="360000"/>
           </a:xfrm>
           <a:prstGeom prst="straightConnector1">
             <a:avLst/>
@@ -4920,7 +4937,7 @@
         </p:nvSpPr>
         <p:spPr>
           <a:xfrm>
-            <a:off x="1350632" y="2880798"/>
+            <a:off x="1353778" y="2090311"/>
             <a:ext cx="502062" cy="369332"/>
           </a:xfrm>
           <a:prstGeom prst="rect">
@@ -4957,10 +4974,10 @@
         </p:nvGrpSpPr>
         <p:grpSpPr>
           <a:xfrm>
-            <a:off x="3420269" y="59955"/>
-            <a:ext cx="3259705" cy="541790"/>
-            <a:chOff x="3263015" y="1192280"/>
-            <a:chExt cx="3259705" cy="541790"/>
+            <a:off x="341856" y="2462764"/>
+            <a:ext cx="6156825" cy="308750"/>
+            <a:chOff x="1133610" y="3804743"/>
+            <a:chExt cx="6156825" cy="308750"/>
           </a:xfrm>
         </p:grpSpPr>
         <p:sp>
@@ -4977,8 +4994,8 @@
           </p:nvSpPr>
           <p:spPr>
             <a:xfrm>
-              <a:off x="3263015" y="1222782"/>
-              <a:ext cx="3259705" cy="503327"/>
+              <a:off x="1133610" y="3806832"/>
+              <a:ext cx="6125936" cy="288000"/>
             </a:xfrm>
             <a:prstGeom prst="roundRect">
               <a:avLst>
@@ -5024,9 +5041,9 @@
             <p:nvPr/>
           </p:nvCxnSpPr>
           <p:spPr>
-            <a:xfrm flipV="1">
-              <a:off x="3415416" y="1353280"/>
-              <a:ext cx="1370162" cy="16258"/>
+            <a:xfrm>
+              <a:off x="1221885" y="3960821"/>
+              <a:ext cx="1330569" cy="0"/>
             </a:xfrm>
             <a:prstGeom prst="straightConnector1">
               <a:avLst/>
@@ -5067,7 +5084,7 @@
           </p:nvCxnSpPr>
           <p:spPr>
             <a:xfrm>
-              <a:off x="3416030" y="1588883"/>
+              <a:off x="4229425" y="3960821"/>
               <a:ext cx="1369548" cy="0"/>
             </a:xfrm>
             <a:prstGeom prst="straightConnector1">
@@ -5113,7 +5130,7 @@
           </p:nvSpPr>
           <p:spPr>
             <a:xfrm>
-              <a:off x="4732856" y="1192280"/>
+              <a:off x="2516339" y="3804743"/>
               <a:ext cx="1508426" cy="307777"/>
             </a:xfrm>
             <a:prstGeom prst="rect">
@@ -5155,7 +5172,7 @@
           </p:nvSpPr>
           <p:spPr>
             <a:xfrm>
-              <a:off x="4760503" y="1426293"/>
+              <a:off x="5564000" y="3805716"/>
               <a:ext cx="1726435" cy="307777"/>
             </a:xfrm>
             <a:prstGeom prst="rect">

</xml_diff>